<commit_message>
1023 BE Lab Meeting Slides
</commit_message>
<xml_diff>
--- a/SJDM_Poster.pptx
+++ b/SJDM_Poster.pptx
@@ -104,6 +104,11 @@
       </a:defRPr>
     </a:lvl9pPr>
   </p:defaultTextStyle>
+  <p:extLst>
+    <p:ext uri="{EFAFB233-063F-42B5-8137-9DF3F51BA10A}">
+      <p15:sldGuideLst xmlns:p15="http://schemas.microsoft.com/office/powerpoint/2012/main"/>
+    </p:ext>
+  </p:extLst>
 </p:presentation>
 </file>
 
@@ -238,7 +243,7 @@
           <a:p>
             <a:fld id="{C30E846A-16E3-3343-947B-D0AF6631BA53}" type="datetimeFigureOut">
               <a:rPr lang="en-US" smtClean="0"/>
-              <a:t>10/15/25</a:t>
+              <a:t>10/21/25</a:t>
             </a:fld>
             <a:endParaRPr lang="en-US"/>
           </a:p>
@@ -408,7 +413,7 @@
           <a:p>
             <a:fld id="{C30E846A-16E3-3343-947B-D0AF6631BA53}" type="datetimeFigureOut">
               <a:rPr lang="en-US" smtClean="0"/>
-              <a:t>10/15/25</a:t>
+              <a:t>10/21/25</a:t>
             </a:fld>
             <a:endParaRPr lang="en-US"/>
           </a:p>
@@ -588,7 +593,7 @@
           <a:p>
             <a:fld id="{C30E846A-16E3-3343-947B-D0AF6631BA53}" type="datetimeFigureOut">
               <a:rPr lang="en-US" smtClean="0"/>
-              <a:t>10/15/25</a:t>
+              <a:t>10/21/25</a:t>
             </a:fld>
             <a:endParaRPr lang="en-US"/>
           </a:p>
@@ -758,7 +763,7 @@
           <a:p>
             <a:fld id="{C30E846A-16E3-3343-947B-D0AF6631BA53}" type="datetimeFigureOut">
               <a:rPr lang="en-US" smtClean="0"/>
-              <a:t>10/15/25</a:t>
+              <a:t>10/21/25</a:t>
             </a:fld>
             <a:endParaRPr lang="en-US"/>
           </a:p>
@@ -1004,7 +1009,7 @@
           <a:p>
             <a:fld id="{C30E846A-16E3-3343-947B-D0AF6631BA53}" type="datetimeFigureOut">
               <a:rPr lang="en-US" smtClean="0"/>
-              <a:t>10/15/25</a:t>
+              <a:t>10/21/25</a:t>
             </a:fld>
             <a:endParaRPr lang="en-US"/>
           </a:p>
@@ -1236,7 +1241,7 @@
           <a:p>
             <a:fld id="{C30E846A-16E3-3343-947B-D0AF6631BA53}" type="datetimeFigureOut">
               <a:rPr lang="en-US" smtClean="0"/>
-              <a:t>10/15/25</a:t>
+              <a:t>10/21/25</a:t>
             </a:fld>
             <a:endParaRPr lang="en-US"/>
           </a:p>
@@ -1603,7 +1608,7 @@
           <a:p>
             <a:fld id="{C30E846A-16E3-3343-947B-D0AF6631BA53}" type="datetimeFigureOut">
               <a:rPr lang="en-US" smtClean="0"/>
-              <a:t>10/15/25</a:t>
+              <a:t>10/21/25</a:t>
             </a:fld>
             <a:endParaRPr lang="en-US"/>
           </a:p>
@@ -1721,7 +1726,7 @@
           <a:p>
             <a:fld id="{C30E846A-16E3-3343-947B-D0AF6631BA53}" type="datetimeFigureOut">
               <a:rPr lang="en-US" smtClean="0"/>
-              <a:t>10/15/25</a:t>
+              <a:t>10/21/25</a:t>
             </a:fld>
             <a:endParaRPr lang="en-US"/>
           </a:p>
@@ -1816,7 +1821,7 @@
           <a:p>
             <a:fld id="{C30E846A-16E3-3343-947B-D0AF6631BA53}" type="datetimeFigureOut">
               <a:rPr lang="en-US" smtClean="0"/>
-              <a:t>10/15/25</a:t>
+              <a:t>10/21/25</a:t>
             </a:fld>
             <a:endParaRPr lang="en-US"/>
           </a:p>
@@ -2093,7 +2098,7 @@
           <a:p>
             <a:fld id="{C30E846A-16E3-3343-947B-D0AF6631BA53}" type="datetimeFigureOut">
               <a:rPr lang="en-US" smtClean="0"/>
-              <a:t>10/15/25</a:t>
+              <a:t>10/21/25</a:t>
             </a:fld>
             <a:endParaRPr lang="en-US"/>
           </a:p>
@@ -2350,7 +2355,7 @@
           <a:p>
             <a:fld id="{C30E846A-16E3-3343-947B-D0AF6631BA53}" type="datetimeFigureOut">
               <a:rPr lang="en-US" smtClean="0"/>
-              <a:t>10/15/25</a:t>
+              <a:t>10/21/25</a:t>
             </a:fld>
             <a:endParaRPr lang="en-US"/>
           </a:p>
@@ -2563,7 +2568,7 @@
           <a:p>
             <a:fld id="{C30E846A-16E3-3343-947B-D0AF6631BA53}" type="datetimeFigureOut">
               <a:rPr lang="en-US" smtClean="0"/>
-              <a:t>10/15/25</a:t>
+              <a:t>10/21/25</a:t>
             </a:fld>
             <a:endParaRPr lang="en-US"/>
           </a:p>

</xml_diff>

<commit_message>
update plots for SJDM poster
</commit_message>
<xml_diff>
--- a/SJDM_Poster.pptx
+++ b/SJDM_Poster.pptx
@@ -243,7 +243,7 @@
           <a:p>
             <a:fld id="{C30E846A-16E3-3343-947B-D0AF6631BA53}" type="datetimeFigureOut">
               <a:rPr lang="en-US" smtClean="0"/>
-              <a:t>10/21/25</a:t>
+              <a:t>10/29/25</a:t>
             </a:fld>
             <a:endParaRPr lang="en-US"/>
           </a:p>
@@ -413,7 +413,7 @@
           <a:p>
             <a:fld id="{C30E846A-16E3-3343-947B-D0AF6631BA53}" type="datetimeFigureOut">
               <a:rPr lang="en-US" smtClean="0"/>
-              <a:t>10/21/25</a:t>
+              <a:t>10/29/25</a:t>
             </a:fld>
             <a:endParaRPr lang="en-US"/>
           </a:p>
@@ -593,7 +593,7 @@
           <a:p>
             <a:fld id="{C30E846A-16E3-3343-947B-D0AF6631BA53}" type="datetimeFigureOut">
               <a:rPr lang="en-US" smtClean="0"/>
-              <a:t>10/21/25</a:t>
+              <a:t>10/29/25</a:t>
             </a:fld>
             <a:endParaRPr lang="en-US"/>
           </a:p>
@@ -763,7 +763,7 @@
           <a:p>
             <a:fld id="{C30E846A-16E3-3343-947B-D0AF6631BA53}" type="datetimeFigureOut">
               <a:rPr lang="en-US" smtClean="0"/>
-              <a:t>10/21/25</a:t>
+              <a:t>10/29/25</a:t>
             </a:fld>
             <a:endParaRPr lang="en-US"/>
           </a:p>
@@ -1009,7 +1009,7 @@
           <a:p>
             <a:fld id="{C30E846A-16E3-3343-947B-D0AF6631BA53}" type="datetimeFigureOut">
               <a:rPr lang="en-US" smtClean="0"/>
-              <a:t>10/21/25</a:t>
+              <a:t>10/29/25</a:t>
             </a:fld>
             <a:endParaRPr lang="en-US"/>
           </a:p>
@@ -1241,7 +1241,7 @@
           <a:p>
             <a:fld id="{C30E846A-16E3-3343-947B-D0AF6631BA53}" type="datetimeFigureOut">
               <a:rPr lang="en-US" smtClean="0"/>
-              <a:t>10/21/25</a:t>
+              <a:t>10/29/25</a:t>
             </a:fld>
             <a:endParaRPr lang="en-US"/>
           </a:p>
@@ -1608,7 +1608,7 @@
           <a:p>
             <a:fld id="{C30E846A-16E3-3343-947B-D0AF6631BA53}" type="datetimeFigureOut">
               <a:rPr lang="en-US" smtClean="0"/>
-              <a:t>10/21/25</a:t>
+              <a:t>10/29/25</a:t>
             </a:fld>
             <a:endParaRPr lang="en-US"/>
           </a:p>
@@ -1726,7 +1726,7 @@
           <a:p>
             <a:fld id="{C30E846A-16E3-3343-947B-D0AF6631BA53}" type="datetimeFigureOut">
               <a:rPr lang="en-US" smtClean="0"/>
-              <a:t>10/21/25</a:t>
+              <a:t>10/29/25</a:t>
             </a:fld>
             <a:endParaRPr lang="en-US"/>
           </a:p>
@@ -1821,7 +1821,7 @@
           <a:p>
             <a:fld id="{C30E846A-16E3-3343-947B-D0AF6631BA53}" type="datetimeFigureOut">
               <a:rPr lang="en-US" smtClean="0"/>
-              <a:t>10/21/25</a:t>
+              <a:t>10/29/25</a:t>
             </a:fld>
             <a:endParaRPr lang="en-US"/>
           </a:p>
@@ -2098,7 +2098,7 @@
           <a:p>
             <a:fld id="{C30E846A-16E3-3343-947B-D0AF6631BA53}" type="datetimeFigureOut">
               <a:rPr lang="en-US" smtClean="0"/>
-              <a:t>10/21/25</a:t>
+              <a:t>10/29/25</a:t>
             </a:fld>
             <a:endParaRPr lang="en-US"/>
           </a:p>
@@ -2355,7 +2355,7 @@
           <a:p>
             <a:fld id="{C30E846A-16E3-3343-947B-D0AF6631BA53}" type="datetimeFigureOut">
               <a:rPr lang="en-US" smtClean="0"/>
-              <a:t>10/21/25</a:t>
+              <a:t>10/29/25</a:t>
             </a:fld>
             <a:endParaRPr lang="en-US"/>
           </a:p>
@@ -2568,7 +2568,7 @@
           <a:p>
             <a:fld id="{C30E846A-16E3-3343-947B-D0AF6631BA53}" type="datetimeFigureOut">
               <a:rPr lang="en-US" smtClean="0"/>
-              <a:t>10/21/25</a:t>
+              <a:t>10/29/25</a:t>
             </a:fld>
             <a:endParaRPr lang="en-US"/>
           </a:p>
@@ -3156,7 +3156,7 @@
         <p:spPr>
           <a:xfrm>
             <a:off x="10478494" y="4682648"/>
-            <a:ext cx="11958141" cy="16963265"/>
+            <a:ext cx="11958141" cy="16836282"/>
           </a:xfrm>
           <a:prstGeom prst="rect">
             <a:avLst/>
@@ -3182,223 +3182,7 @@
           <a:lstStyle/>
           <a:p>
             <a:pPr algn="ctr"/>
-            <a:endParaRPr lang="en-US" sz="2000"/>
-          </a:p>
-        </p:txBody>
-      </p:sp>
-      <p:sp>
-        <p:nvSpPr>
-          <p:cNvPr id="10" name="Rectangle 9">
-            <a:extLst>
-              <a:ext uri="{FF2B5EF4-FFF2-40B4-BE49-F238E27FC236}">
-                <a16:creationId xmlns:a16="http://schemas.microsoft.com/office/drawing/2014/main" id="{4DD789A2-BBFF-6DE5-ED2A-6D3E74B37009}"/>
-              </a:ext>
-            </a:extLst>
-          </p:cNvPr>
-          <p:cNvSpPr/>
-          <p:nvPr/>
-        </p:nvSpPr>
-        <p:spPr>
-          <a:xfrm>
-            <a:off x="10745571" y="5970625"/>
-            <a:ext cx="5347869" cy="3589383"/>
-          </a:xfrm>
-          <a:prstGeom prst="rect">
-            <a:avLst/>
-          </a:prstGeom>
-          <a:solidFill>
-            <a:schemeClr val="bg2">
-              <a:lumMod val="90000"/>
-            </a:schemeClr>
-          </a:solidFill>
-          <a:ln>
-            <a:noFill/>
-          </a:ln>
-        </p:spPr>
-        <p:style>
-          <a:lnRef idx="2">
-            <a:schemeClr val="accent1">
-              <a:shade val="15000"/>
-            </a:schemeClr>
-          </a:lnRef>
-          <a:fillRef idx="1">
-            <a:schemeClr val="accent1"/>
-          </a:fillRef>
-          <a:effectRef idx="0">
-            <a:schemeClr val="accent1"/>
-          </a:effectRef>
-          <a:fontRef idx="minor">
-            <a:schemeClr val="lt1"/>
-          </a:fontRef>
-        </p:style>
-        <p:txBody>
-          <a:bodyPr rtlCol="0" anchor="ctr"/>
-          <a:lstStyle/>
-          <a:p>
-            <a:pPr algn="ctr"/>
-            <a:endParaRPr lang="en-US" dirty="0"/>
-          </a:p>
-        </p:txBody>
-      </p:sp>
-      <p:sp>
-        <p:nvSpPr>
-          <p:cNvPr id="11" name="Rectangle 10">
-            <a:extLst>
-              <a:ext uri="{FF2B5EF4-FFF2-40B4-BE49-F238E27FC236}">
-                <a16:creationId xmlns:a16="http://schemas.microsoft.com/office/drawing/2014/main" id="{9D4CD5E7-69FB-4659-6FB7-AE99A1236082}"/>
-              </a:ext>
-            </a:extLst>
-          </p:cNvPr>
-          <p:cNvSpPr/>
-          <p:nvPr/>
-        </p:nvSpPr>
-        <p:spPr>
-          <a:xfrm>
-            <a:off x="16824962" y="5970624"/>
-            <a:ext cx="5347869" cy="3589383"/>
-          </a:xfrm>
-          <a:prstGeom prst="rect">
-            <a:avLst/>
-          </a:prstGeom>
-          <a:solidFill>
-            <a:schemeClr val="bg2">
-              <a:lumMod val="90000"/>
-            </a:schemeClr>
-          </a:solidFill>
-          <a:ln>
-            <a:noFill/>
-          </a:ln>
-        </p:spPr>
-        <p:style>
-          <a:lnRef idx="2">
-            <a:schemeClr val="accent1">
-              <a:shade val="15000"/>
-            </a:schemeClr>
-          </a:lnRef>
-          <a:fillRef idx="1">
-            <a:schemeClr val="accent1"/>
-          </a:fillRef>
-          <a:effectRef idx="0">
-            <a:schemeClr val="accent1"/>
-          </a:effectRef>
-          <a:fontRef idx="minor">
-            <a:schemeClr val="lt1"/>
-          </a:fontRef>
-        </p:style>
-        <p:txBody>
-          <a:bodyPr rtlCol="0" anchor="ctr"/>
-          <a:lstStyle/>
-          <a:p>
-            <a:pPr algn="ctr"/>
-            <a:endParaRPr lang="en-US" dirty="0"/>
-          </a:p>
-        </p:txBody>
-      </p:sp>
-      <p:sp>
-        <p:nvSpPr>
-          <p:cNvPr id="12" name="Rectangle 11">
-            <a:extLst>
-              <a:ext uri="{FF2B5EF4-FFF2-40B4-BE49-F238E27FC236}">
-                <a16:creationId xmlns:a16="http://schemas.microsoft.com/office/drawing/2014/main" id="{22F9F8EB-58AB-EFF3-45D5-D9145969971F}"/>
-              </a:ext>
-            </a:extLst>
-          </p:cNvPr>
-          <p:cNvSpPr/>
-          <p:nvPr/>
-        </p:nvSpPr>
-        <p:spPr>
-          <a:xfrm>
-            <a:off x="11862571" y="11571878"/>
-            <a:ext cx="9189985" cy="3589383"/>
-          </a:xfrm>
-          <a:prstGeom prst="rect">
-            <a:avLst/>
-          </a:prstGeom>
-          <a:solidFill>
-            <a:schemeClr val="bg2">
-              <a:lumMod val="90000"/>
-            </a:schemeClr>
-          </a:solidFill>
-          <a:ln>
-            <a:noFill/>
-          </a:ln>
-        </p:spPr>
-        <p:style>
-          <a:lnRef idx="2">
-            <a:schemeClr val="accent1">
-              <a:shade val="15000"/>
-            </a:schemeClr>
-          </a:lnRef>
-          <a:fillRef idx="1">
-            <a:schemeClr val="accent1"/>
-          </a:fillRef>
-          <a:effectRef idx="0">
-            <a:schemeClr val="accent1"/>
-          </a:effectRef>
-          <a:fontRef idx="minor">
-            <a:schemeClr val="lt1"/>
-          </a:fontRef>
-        </p:style>
-        <p:txBody>
-          <a:bodyPr rtlCol="0" anchor="ctr"/>
-          <a:lstStyle/>
-          <a:p>
-            <a:pPr algn="ctr"/>
-            <a:endParaRPr lang="en-US" dirty="0"/>
-          </a:p>
-        </p:txBody>
-      </p:sp>
-      <p:sp>
-        <p:nvSpPr>
-          <p:cNvPr id="13" name="Rectangle 12">
-            <a:extLst>
-              <a:ext uri="{FF2B5EF4-FFF2-40B4-BE49-F238E27FC236}">
-                <a16:creationId xmlns:a16="http://schemas.microsoft.com/office/drawing/2014/main" id="{0D8F4699-A70D-DB55-8D37-919A9CA89F0F}"/>
-              </a:ext>
-            </a:extLst>
-          </p:cNvPr>
-          <p:cNvSpPr/>
-          <p:nvPr/>
-        </p:nvSpPr>
-        <p:spPr>
-          <a:xfrm>
-            <a:off x="11862571" y="16684091"/>
-            <a:ext cx="9189985" cy="3589383"/>
-          </a:xfrm>
-          <a:prstGeom prst="rect">
-            <a:avLst/>
-          </a:prstGeom>
-          <a:solidFill>
-            <a:schemeClr val="bg2">
-              <a:lumMod val="90000"/>
-            </a:schemeClr>
-          </a:solidFill>
-          <a:ln>
-            <a:noFill/>
-          </a:ln>
-        </p:spPr>
-        <p:style>
-          <a:lnRef idx="2">
-            <a:schemeClr val="accent1">
-              <a:shade val="15000"/>
-            </a:schemeClr>
-          </a:lnRef>
-          <a:fillRef idx="1">
-            <a:schemeClr val="accent1"/>
-          </a:fillRef>
-          <a:effectRef idx="0">
-            <a:schemeClr val="accent1"/>
-          </a:effectRef>
-          <a:fontRef idx="minor">
-            <a:schemeClr val="lt1"/>
-          </a:fontRef>
-        </p:style>
-        <p:txBody>
-          <a:bodyPr rtlCol="0" anchor="ctr"/>
-          <a:lstStyle/>
-          <a:p>
-            <a:pPr algn="ctr"/>
-            <a:endParaRPr lang="en-US" dirty="0"/>
+            <a:endParaRPr lang="en-US" sz="2000" dirty="0"/>
           </a:p>
         </p:txBody>
       </p:sp>
@@ -5287,6 +5071,1770 @@
                 <a:cs typeface="Times New Roman" panose="02020603050405020304" pitchFamily="18" charset="0"/>
               </a:rPr>
               <a:t>It’s doubtful that if B will still be chosen if participants are allowed to choose two lotteries</a:t>
+            </a:r>
+          </a:p>
+        </p:txBody>
+      </p:sp>
+      <p:grpSp>
+        <p:nvGrpSpPr>
+          <p:cNvPr id="85" name="Group 84">
+            <a:extLst>
+              <a:ext uri="{FF2B5EF4-FFF2-40B4-BE49-F238E27FC236}">
+                <a16:creationId xmlns:a16="http://schemas.microsoft.com/office/drawing/2014/main" id="{C00259DD-6913-E6C3-FB3D-37E44B36BA05}"/>
+              </a:ext>
+            </a:extLst>
+          </p:cNvPr>
+          <p:cNvGrpSpPr/>
+          <p:nvPr/>
+        </p:nvGrpSpPr>
+        <p:grpSpPr>
+          <a:xfrm>
+            <a:off x="11910635" y="10132766"/>
+            <a:ext cx="8571612" cy="10382439"/>
+            <a:chOff x="12411192" y="9837006"/>
+            <a:chExt cx="8405744" cy="10181530"/>
+          </a:xfrm>
+        </p:grpSpPr>
+        <p:grpSp>
+          <p:nvGrpSpPr>
+            <p:cNvPr id="55" name="Group 54">
+              <a:extLst>
+                <a:ext uri="{FF2B5EF4-FFF2-40B4-BE49-F238E27FC236}">
+                  <a16:creationId xmlns:a16="http://schemas.microsoft.com/office/drawing/2014/main" id="{8DF8D731-73A1-4104-E7CB-B5F9811649B3}"/>
+                </a:ext>
+              </a:extLst>
+            </p:cNvPr>
+            <p:cNvGrpSpPr/>
+            <p:nvPr/>
+          </p:nvGrpSpPr>
+          <p:grpSpPr>
+            <a:xfrm>
+              <a:off x="12986421" y="19060993"/>
+              <a:ext cx="7830515" cy="369332"/>
+              <a:chOff x="11568951" y="8214746"/>
+              <a:chExt cx="5488255" cy="369332"/>
+            </a:xfrm>
+          </p:grpSpPr>
+          <p:sp>
+            <p:nvSpPr>
+              <p:cNvPr id="57" name="TextBox 56">
+                <a:extLst>
+                  <a:ext uri="{FF2B5EF4-FFF2-40B4-BE49-F238E27FC236}">
+                    <a16:creationId xmlns:a16="http://schemas.microsoft.com/office/drawing/2014/main" id="{6B590E2A-D82C-563D-5277-0A7182773F74}"/>
+                  </a:ext>
+                </a:extLst>
+              </p:cNvPr>
+              <p:cNvSpPr txBox="1"/>
+              <p:nvPr/>
+            </p:nvSpPr>
+            <p:spPr>
+              <a:xfrm>
+                <a:off x="11568951" y="8214746"/>
+                <a:ext cx="2331344" cy="369332"/>
+              </a:xfrm>
+              <a:prstGeom prst="rect">
+                <a:avLst/>
+              </a:prstGeom>
+              <a:noFill/>
+            </p:spPr>
+            <p:txBody>
+              <a:bodyPr wrap="none" rtlCol="0">
+                <a:spAutoFit/>
+              </a:bodyPr>
+              <a:lstStyle/>
+              <a:p>
+                <a:r>
+                  <a:rPr lang="en-US" dirty="0"/>
+                  <a:t>Most dissimilar in risk</a:t>
+                </a:r>
+              </a:p>
+            </p:txBody>
+          </p:sp>
+          <p:sp>
+            <p:nvSpPr>
+              <p:cNvPr id="68" name="TextBox 67">
+                <a:extLst>
+                  <a:ext uri="{FF2B5EF4-FFF2-40B4-BE49-F238E27FC236}">
+                    <a16:creationId xmlns:a16="http://schemas.microsoft.com/office/drawing/2014/main" id="{626C03C0-8DAD-CC4C-2991-F485493FE50C}"/>
+                  </a:ext>
+                </a:extLst>
+              </p:cNvPr>
+              <p:cNvSpPr txBox="1"/>
+              <p:nvPr/>
+            </p:nvSpPr>
+            <p:spPr>
+              <a:xfrm>
+                <a:off x="15631063" y="8214746"/>
+                <a:ext cx="1426143" cy="369332"/>
+              </a:xfrm>
+              <a:prstGeom prst="rect">
+                <a:avLst/>
+              </a:prstGeom>
+              <a:noFill/>
+            </p:spPr>
+            <p:txBody>
+              <a:bodyPr wrap="none" rtlCol="0">
+                <a:spAutoFit/>
+              </a:bodyPr>
+              <a:lstStyle/>
+              <a:p>
+                <a:r>
+                  <a:rPr lang="en-US" dirty="0"/>
+                  <a:t>Most similar in risk</a:t>
+                </a:r>
+              </a:p>
+            </p:txBody>
+          </p:sp>
+        </p:grpSp>
+        <p:grpSp>
+          <p:nvGrpSpPr>
+            <p:cNvPr id="84" name="Group 83">
+              <a:extLst>
+                <a:ext uri="{FF2B5EF4-FFF2-40B4-BE49-F238E27FC236}">
+                  <a16:creationId xmlns:a16="http://schemas.microsoft.com/office/drawing/2014/main" id="{7C2BD904-B9CC-0B48-C0B7-13746589464C}"/>
+                </a:ext>
+              </a:extLst>
+            </p:cNvPr>
+            <p:cNvGrpSpPr/>
+            <p:nvPr/>
+          </p:nvGrpSpPr>
+          <p:grpSpPr>
+            <a:xfrm>
+              <a:off x="12411192" y="9837006"/>
+              <a:ext cx="8347629" cy="10181530"/>
+              <a:chOff x="12411192" y="9837006"/>
+              <a:chExt cx="8347629" cy="10181530"/>
+            </a:xfrm>
+          </p:grpSpPr>
+          <p:pic>
+            <p:nvPicPr>
+              <p:cNvPr id="19" name="Picture 18" descr="A graph with numbers and lines&#10;&#10;AI-generated content may be incorrect.">
+                <a:extLst>
+                  <a:ext uri="{FF2B5EF4-FFF2-40B4-BE49-F238E27FC236}">
+                    <a16:creationId xmlns:a16="http://schemas.microsoft.com/office/drawing/2014/main" id="{937E6F42-A31E-647F-CDE7-3124CC296AA9}"/>
+                  </a:ext>
+                </a:extLst>
+              </p:cNvPr>
+              <p:cNvPicPr>
+                <a:picLocks noChangeAspect="1"/>
+              </p:cNvPicPr>
+              <p:nvPr/>
+            </p:nvPicPr>
+            <p:blipFill>
+              <a:blip r:embed="rId7"/>
+              <a:srcRect t="16833"/>
+              <a:stretch>
+                <a:fillRect/>
+              </a:stretch>
+            </p:blipFill>
+            <p:spPr>
+              <a:xfrm>
+                <a:off x="14029815" y="10379914"/>
+                <a:ext cx="5685615" cy="2747510"/>
+              </a:xfrm>
+              <a:prstGeom prst="rect">
+                <a:avLst/>
+              </a:prstGeom>
+              <a:ln w="12700">
+                <a:solidFill>
+                  <a:schemeClr val="tx1"/>
+                </a:solidFill>
+              </a:ln>
+            </p:spPr>
+          </p:pic>
+          <p:sp>
+            <p:nvSpPr>
+              <p:cNvPr id="21" name="TextBox 20">
+                <a:extLst>
+                  <a:ext uri="{FF2B5EF4-FFF2-40B4-BE49-F238E27FC236}">
+                    <a16:creationId xmlns:a16="http://schemas.microsoft.com/office/drawing/2014/main" id="{10896528-4CEB-182E-56D4-7CD10E906570}"/>
+                  </a:ext>
+                </a:extLst>
+              </p:cNvPr>
+              <p:cNvSpPr txBox="1"/>
+              <p:nvPr/>
+            </p:nvSpPr>
+            <p:spPr>
+              <a:xfrm rot="16200000">
+                <a:off x="11942527" y="11747227"/>
+                <a:ext cx="3456139" cy="307777"/>
+              </a:xfrm>
+              <a:prstGeom prst="rect">
+                <a:avLst/>
+              </a:prstGeom>
+              <a:noFill/>
+            </p:spPr>
+            <p:txBody>
+              <a:bodyPr wrap="none" rtlCol="0">
+                <a:spAutoFit/>
+              </a:bodyPr>
+              <a:lstStyle/>
+              <a:p>
+                <a:r>
+                  <a:rPr lang="en-US" sz="1400" dirty="0"/>
+                  <a:t>P(Chosen | Focal) – P(Chosen | Non-Focal)</a:t>
+                </a:r>
+              </a:p>
+            </p:txBody>
+          </p:sp>
+          <p:sp>
+            <p:nvSpPr>
+              <p:cNvPr id="22" name="TextBox 21">
+                <a:extLst>
+                  <a:ext uri="{FF2B5EF4-FFF2-40B4-BE49-F238E27FC236}">
+                    <a16:creationId xmlns:a16="http://schemas.microsoft.com/office/drawing/2014/main" id="{712295D7-BDA4-4276-6DF0-6CED0FF9F28E}"/>
+                  </a:ext>
+                </a:extLst>
+              </p:cNvPr>
+              <p:cNvSpPr txBox="1"/>
+              <p:nvPr/>
+            </p:nvSpPr>
+            <p:spPr>
+              <a:xfrm>
+                <a:off x="14352284" y="9837006"/>
+                <a:ext cx="5013937" cy="369332"/>
+              </a:xfrm>
+              <a:prstGeom prst="rect">
+                <a:avLst/>
+              </a:prstGeom>
+              <a:noFill/>
+            </p:spPr>
+            <p:txBody>
+              <a:bodyPr wrap="none" rtlCol="0">
+                <a:spAutoFit/>
+              </a:bodyPr>
+              <a:lstStyle/>
+              <a:p>
+                <a:r>
+                  <a:rPr lang="en-US" dirty="0"/>
+                  <a:t>Preference Reversal: Safe Decoy </a:t>
+                </a:r>
+                <a:r>
+                  <a:rPr lang="en-US" dirty="0" err="1"/>
+                  <a:t>v.s</a:t>
+                </a:r>
+                <a:r>
+                  <a:rPr lang="en-US" dirty="0"/>
+                  <a:t>. Risky Decoy</a:t>
+                </a:r>
+              </a:p>
+            </p:txBody>
+          </p:sp>
+          <p:pic>
+            <p:nvPicPr>
+              <p:cNvPr id="33" name="Picture 32" descr="A graph with numbers and lines&#10;&#10;AI-generated content may be incorrect.">
+                <a:extLst>
+                  <a:ext uri="{FF2B5EF4-FFF2-40B4-BE49-F238E27FC236}">
+                    <a16:creationId xmlns:a16="http://schemas.microsoft.com/office/drawing/2014/main" id="{53342A9B-2686-FBF5-1AE5-42E296690DD4}"/>
+                  </a:ext>
+                </a:extLst>
+              </p:cNvPr>
+              <p:cNvPicPr>
+                <a:picLocks noChangeAspect="1"/>
+              </p:cNvPicPr>
+              <p:nvPr/>
+            </p:nvPicPr>
+            <p:blipFill>
+              <a:blip r:embed="rId8"/>
+              <a:stretch>
+                <a:fillRect/>
+              </a:stretch>
+            </p:blipFill>
+            <p:spPr>
+              <a:xfrm>
+                <a:off x="12986421" y="15707573"/>
+                <a:ext cx="7772400" cy="3239223"/>
+              </a:xfrm>
+              <a:prstGeom prst="rect">
+                <a:avLst/>
+              </a:prstGeom>
+              <a:ln w="12700">
+                <a:solidFill>
+                  <a:schemeClr val="tx1"/>
+                </a:solidFill>
+              </a:ln>
+            </p:spPr>
+          </p:pic>
+          <p:sp>
+            <p:nvSpPr>
+              <p:cNvPr id="37" name="TextBox 36">
+                <a:extLst>
+                  <a:ext uri="{FF2B5EF4-FFF2-40B4-BE49-F238E27FC236}">
+                    <a16:creationId xmlns:a16="http://schemas.microsoft.com/office/drawing/2014/main" id="{1ED62682-EB63-3FF9-AEE1-E4B3B330C309}"/>
+                  </a:ext>
+                </a:extLst>
+              </p:cNvPr>
+              <p:cNvSpPr txBox="1"/>
+              <p:nvPr/>
+            </p:nvSpPr>
+            <p:spPr>
+              <a:xfrm rot="16200000">
+                <a:off x="10837011" y="17263573"/>
+                <a:ext cx="3456139" cy="307777"/>
+              </a:xfrm>
+              <a:prstGeom prst="rect">
+                <a:avLst/>
+              </a:prstGeom>
+              <a:noFill/>
+            </p:spPr>
+            <p:txBody>
+              <a:bodyPr wrap="none" rtlCol="0">
+                <a:spAutoFit/>
+              </a:bodyPr>
+              <a:lstStyle/>
+              <a:p>
+                <a:r>
+                  <a:rPr lang="en-US" sz="1400" dirty="0"/>
+                  <a:t>P(Chosen | Focal) – P(Chosen | Non-Focal)</a:t>
+                </a:r>
+              </a:p>
+            </p:txBody>
+          </p:sp>
+          <p:sp>
+            <p:nvSpPr>
+              <p:cNvPr id="38" name="TextBox 37">
+                <a:extLst>
+                  <a:ext uri="{FF2B5EF4-FFF2-40B4-BE49-F238E27FC236}">
+                    <a16:creationId xmlns:a16="http://schemas.microsoft.com/office/drawing/2014/main" id="{53CBE9CB-B2DF-86E9-42F1-7953FA7A6C82}"/>
+                  </a:ext>
+                </a:extLst>
+              </p:cNvPr>
+              <p:cNvSpPr txBox="1"/>
+              <p:nvPr/>
+            </p:nvSpPr>
+            <p:spPr>
+              <a:xfrm>
+                <a:off x="13553026" y="15205812"/>
+                <a:ext cx="6639190" cy="369332"/>
+              </a:xfrm>
+              <a:prstGeom prst="rect">
+                <a:avLst/>
+              </a:prstGeom>
+              <a:noFill/>
+            </p:spPr>
+            <p:txBody>
+              <a:bodyPr wrap="none" rtlCol="0">
+                <a:spAutoFit/>
+              </a:bodyPr>
+              <a:lstStyle/>
+              <a:p>
+                <a:r>
+                  <a:rPr lang="en-US" dirty="0"/>
+                  <a:t>Heterogeneity in Preference Reversal Across Pair Characteristics</a:t>
+                </a:r>
+              </a:p>
+            </p:txBody>
+          </p:sp>
+          <p:grpSp>
+            <p:nvGrpSpPr>
+              <p:cNvPr id="51" name="Group 50">
+                <a:extLst>
+                  <a:ext uri="{FF2B5EF4-FFF2-40B4-BE49-F238E27FC236}">
+                    <a16:creationId xmlns:a16="http://schemas.microsoft.com/office/drawing/2014/main" id="{F33F8450-F161-3763-6347-F8610133E2EE}"/>
+                  </a:ext>
+                </a:extLst>
+              </p:cNvPr>
+              <p:cNvGrpSpPr/>
+              <p:nvPr/>
+            </p:nvGrpSpPr>
+            <p:grpSpPr>
+              <a:xfrm>
+                <a:off x="14352284" y="13259853"/>
+                <a:ext cx="5363146" cy="369332"/>
+                <a:chOff x="11568950" y="8299284"/>
+                <a:chExt cx="5363146" cy="369332"/>
+              </a:xfrm>
+            </p:grpSpPr>
+            <p:sp>
+              <p:nvSpPr>
+                <p:cNvPr id="52" name="TextBox 51">
+                  <a:extLst>
+                    <a:ext uri="{FF2B5EF4-FFF2-40B4-BE49-F238E27FC236}">
+                      <a16:creationId xmlns:a16="http://schemas.microsoft.com/office/drawing/2014/main" id="{D802B61A-B985-53E8-8AF9-B4D8B65AB774}"/>
+                    </a:ext>
+                  </a:extLst>
+                </p:cNvPr>
+                <p:cNvSpPr txBox="1"/>
+                <p:nvPr/>
+              </p:nvSpPr>
+              <p:spPr>
+                <a:xfrm>
+                  <a:off x="11568950" y="8299284"/>
+                  <a:ext cx="815608" cy="369332"/>
+                </a:xfrm>
+                <a:prstGeom prst="rect">
+                  <a:avLst/>
+                </a:prstGeom>
+                <a:noFill/>
+              </p:spPr>
+              <p:txBody>
+                <a:bodyPr wrap="none" rtlCol="0">
+                  <a:spAutoFit/>
+                </a:bodyPr>
+                <a:lstStyle/>
+                <a:p>
+                  <a:r>
+                    <a:rPr lang="en-US" dirty="0"/>
+                    <a:t>Decoy</a:t>
+                  </a:r>
+                </a:p>
+              </p:txBody>
+            </p:sp>
+            <p:sp>
+              <p:nvSpPr>
+                <p:cNvPr id="53" name="TextBox 52">
+                  <a:extLst>
+                    <a:ext uri="{FF2B5EF4-FFF2-40B4-BE49-F238E27FC236}">
+                      <a16:creationId xmlns:a16="http://schemas.microsoft.com/office/drawing/2014/main" id="{991A0A71-D497-4167-740E-C70A6B6342CB}"/>
+                    </a:ext>
+                  </a:extLst>
+                </p:cNvPr>
+                <p:cNvSpPr txBox="1"/>
+                <p:nvPr/>
+              </p:nvSpPr>
+              <p:spPr>
+                <a:xfrm>
+                  <a:off x="13320768" y="8299284"/>
+                  <a:ext cx="1395318" cy="369332"/>
+                </a:xfrm>
+                <a:prstGeom prst="rect">
+                  <a:avLst/>
+                </a:prstGeom>
+                <a:noFill/>
+              </p:spPr>
+              <p:txBody>
+                <a:bodyPr wrap="none" rtlCol="0">
+                  <a:spAutoFit/>
+                </a:bodyPr>
+                <a:lstStyle/>
+                <a:p>
+                  <a:r>
+                    <a:rPr lang="en-US" dirty="0"/>
+                    <a:t>Risky lottery</a:t>
+                  </a:r>
+                </a:p>
+              </p:txBody>
+            </p:sp>
+            <p:sp>
+              <p:nvSpPr>
+                <p:cNvPr id="54" name="TextBox 53">
+                  <a:extLst>
+                    <a:ext uri="{FF2B5EF4-FFF2-40B4-BE49-F238E27FC236}">
+                      <a16:creationId xmlns:a16="http://schemas.microsoft.com/office/drawing/2014/main" id="{60C5494D-6E03-6D51-4EBA-61D99BABAC75}"/>
+                    </a:ext>
+                  </a:extLst>
+                </p:cNvPr>
+                <p:cNvSpPr txBox="1"/>
+                <p:nvPr/>
+              </p:nvSpPr>
+              <p:spPr>
+                <a:xfrm>
+                  <a:off x="15617954" y="8299284"/>
+                  <a:ext cx="1314142" cy="369332"/>
+                </a:xfrm>
+                <a:prstGeom prst="rect">
+                  <a:avLst/>
+                </a:prstGeom>
+                <a:noFill/>
+              </p:spPr>
+              <p:txBody>
+                <a:bodyPr wrap="none" rtlCol="0">
+                  <a:spAutoFit/>
+                </a:bodyPr>
+                <a:lstStyle/>
+                <a:p>
+                  <a:r>
+                    <a:rPr lang="en-US" dirty="0"/>
+                    <a:t>Safe lottery</a:t>
+                  </a:r>
+                </a:p>
+              </p:txBody>
+            </p:sp>
+          </p:grpSp>
+          <p:sp>
+            <p:nvSpPr>
+              <p:cNvPr id="69" name="TextBox 68">
+                <a:extLst>
+                  <a:ext uri="{FF2B5EF4-FFF2-40B4-BE49-F238E27FC236}">
+                    <a16:creationId xmlns:a16="http://schemas.microsoft.com/office/drawing/2014/main" id="{33E576E9-9216-BE01-84E4-E2FF2639E280}"/>
+                  </a:ext>
+                </a:extLst>
+              </p:cNvPr>
+              <p:cNvSpPr txBox="1"/>
+              <p:nvPr/>
+            </p:nvSpPr>
+            <p:spPr>
+              <a:xfrm>
+                <a:off x="15033688" y="19649204"/>
+                <a:ext cx="3677866" cy="369332"/>
+              </a:xfrm>
+              <a:prstGeom prst="rect">
+                <a:avLst/>
+              </a:prstGeom>
+              <a:noFill/>
+            </p:spPr>
+            <p:txBody>
+              <a:bodyPr wrap="none" rtlCol="0">
+                <a:spAutoFit/>
+              </a:bodyPr>
+              <a:lstStyle/>
+              <a:p>
+                <a:r>
+                  <a:rPr lang="en-US" dirty="0"/>
+                  <a:t>Difference in Certainty Equivalence</a:t>
+                </a:r>
+              </a:p>
+            </p:txBody>
+          </p:sp>
+          <p:cxnSp>
+            <p:nvCxnSpPr>
+              <p:cNvPr id="77" name="Straight Arrow Connector 76">
+                <a:extLst>
+                  <a:ext uri="{FF2B5EF4-FFF2-40B4-BE49-F238E27FC236}">
+                    <a16:creationId xmlns:a16="http://schemas.microsoft.com/office/drawing/2014/main" id="{7D249177-105E-3300-9676-035219A4A7F1}"/>
+                  </a:ext>
+                </a:extLst>
+              </p:cNvPr>
+              <p:cNvCxnSpPr>
+                <a:cxnSpLocks/>
+              </p:cNvCxnSpPr>
+              <p:nvPr/>
+            </p:nvCxnSpPr>
+            <p:spPr>
+              <a:xfrm>
+                <a:off x="13670597" y="19515950"/>
+                <a:ext cx="6641276" cy="0"/>
+              </a:xfrm>
+              <a:prstGeom prst="straightConnector1">
+                <a:avLst/>
+              </a:prstGeom>
+              <a:ln w="28575">
+                <a:solidFill>
+                  <a:schemeClr val="tx1"/>
+                </a:solidFill>
+                <a:headEnd type="triangle"/>
+                <a:tailEnd type="triangle"/>
+              </a:ln>
+            </p:spPr>
+            <p:style>
+              <a:lnRef idx="2">
+                <a:schemeClr val="accent1"/>
+              </a:lnRef>
+              <a:fillRef idx="0">
+                <a:schemeClr val="accent1"/>
+              </a:fillRef>
+              <a:effectRef idx="1">
+                <a:schemeClr val="accent1"/>
+              </a:effectRef>
+              <a:fontRef idx="minor">
+                <a:schemeClr val="tx1"/>
+              </a:fontRef>
+            </p:style>
+          </p:cxnSp>
+        </p:grpSp>
+      </p:grpSp>
+      <p:cxnSp>
+        <p:nvCxnSpPr>
+          <p:cNvPr id="88" name="Straight Connector 87">
+            <a:extLst>
+              <a:ext uri="{FF2B5EF4-FFF2-40B4-BE49-F238E27FC236}">
+                <a16:creationId xmlns:a16="http://schemas.microsoft.com/office/drawing/2014/main" id="{48DED4B8-221B-3A3E-DDCC-39A790D5FED9}"/>
+              </a:ext>
+            </a:extLst>
+          </p:cNvPr>
+          <p:cNvCxnSpPr/>
+          <p:nvPr/>
+        </p:nvCxnSpPr>
+        <p:spPr>
+          <a:xfrm>
+            <a:off x="13561198" y="11704320"/>
+            <a:ext cx="5797807" cy="0"/>
+          </a:xfrm>
+          <a:prstGeom prst="line">
+            <a:avLst/>
+          </a:prstGeom>
+          <a:ln w="57150">
+            <a:solidFill>
+              <a:srgbClr val="FF0000">
+                <a:alpha val="20000"/>
+              </a:srgbClr>
+            </a:solidFill>
+          </a:ln>
+        </p:spPr>
+        <p:style>
+          <a:lnRef idx="2">
+            <a:schemeClr val="accent1"/>
+          </a:lnRef>
+          <a:fillRef idx="0">
+            <a:schemeClr val="accent1"/>
+          </a:fillRef>
+          <a:effectRef idx="1">
+            <a:schemeClr val="accent1"/>
+          </a:effectRef>
+          <a:fontRef idx="minor">
+            <a:schemeClr val="tx1"/>
+          </a:fontRef>
+        </p:style>
+      </p:cxnSp>
+      <p:cxnSp>
+        <p:nvCxnSpPr>
+          <p:cNvPr id="92" name="Straight Connector 91">
+            <a:extLst>
+              <a:ext uri="{FF2B5EF4-FFF2-40B4-BE49-F238E27FC236}">
+                <a16:creationId xmlns:a16="http://schemas.microsoft.com/office/drawing/2014/main" id="{CDEBE076-02DA-7930-3FAB-22C68E279607}"/>
+              </a:ext>
+            </a:extLst>
+          </p:cNvPr>
+          <p:cNvCxnSpPr>
+            <a:cxnSpLocks/>
+          </p:cNvCxnSpPr>
+          <p:nvPr/>
+        </p:nvCxnSpPr>
+        <p:spPr>
+          <a:xfrm>
+            <a:off x="12527280" y="17693640"/>
+            <a:ext cx="7895705" cy="0"/>
+          </a:xfrm>
+          <a:prstGeom prst="line">
+            <a:avLst/>
+          </a:prstGeom>
+          <a:ln w="57150">
+            <a:solidFill>
+              <a:srgbClr val="FF0000">
+                <a:alpha val="20000"/>
+              </a:srgbClr>
+            </a:solidFill>
+          </a:ln>
+        </p:spPr>
+        <p:style>
+          <a:lnRef idx="2">
+            <a:schemeClr val="accent1"/>
+          </a:lnRef>
+          <a:fillRef idx="0">
+            <a:schemeClr val="accent1"/>
+          </a:fillRef>
+          <a:effectRef idx="1">
+            <a:schemeClr val="accent1"/>
+          </a:effectRef>
+          <a:fontRef idx="minor">
+            <a:schemeClr val="tx1"/>
+          </a:fontRef>
+        </p:style>
+      </p:cxnSp>
+      <p:grpSp>
+        <p:nvGrpSpPr>
+          <p:cNvPr id="108" name="Group 107">
+            <a:extLst>
+              <a:ext uri="{FF2B5EF4-FFF2-40B4-BE49-F238E27FC236}">
+                <a16:creationId xmlns:a16="http://schemas.microsoft.com/office/drawing/2014/main" id="{54265D9D-536E-9D02-FC59-D0E4A8EC1DA8}"/>
+              </a:ext>
+            </a:extLst>
+          </p:cNvPr>
+          <p:cNvGrpSpPr/>
+          <p:nvPr/>
+        </p:nvGrpSpPr>
+        <p:grpSpPr>
+          <a:xfrm>
+            <a:off x="11013253" y="5454198"/>
+            <a:ext cx="10789990" cy="3904640"/>
+            <a:chOff x="11040971" y="5280917"/>
+            <a:chExt cx="10789990" cy="3904640"/>
+          </a:xfrm>
+        </p:grpSpPr>
+        <p:pic>
+          <p:nvPicPr>
+            <p:cNvPr id="3" name="Picture 2" descr="A graph with numbers and lines&#10;&#10;AI-generated content may be incorrect.">
+              <a:extLst>
+                <a:ext uri="{FF2B5EF4-FFF2-40B4-BE49-F238E27FC236}">
+                  <a16:creationId xmlns:a16="http://schemas.microsoft.com/office/drawing/2014/main" id="{D253DB73-C0DB-E06E-F198-3CDBB202551D}"/>
+                </a:ext>
+              </a:extLst>
+            </p:cNvPr>
+            <p:cNvPicPr>
+              <a:picLocks noChangeAspect="1"/>
+            </p:cNvPicPr>
+            <p:nvPr/>
+          </p:nvPicPr>
+          <p:blipFill>
+            <a:blip r:embed="rId9"/>
+            <a:srcRect t="10752" b="23277"/>
+            <a:stretch>
+              <a:fillRect/>
+            </a:stretch>
+          </p:blipFill>
+          <p:spPr>
+            <a:xfrm>
+              <a:off x="11580425" y="5778458"/>
+              <a:ext cx="5029200" cy="2481921"/>
+            </a:xfrm>
+            <a:prstGeom prst="rect">
+              <a:avLst/>
+            </a:prstGeom>
+            <a:ln w="12700">
+              <a:solidFill>
+                <a:schemeClr val="tx1"/>
+              </a:solidFill>
+            </a:ln>
+          </p:spPr>
+        </p:pic>
+        <p:pic>
+          <p:nvPicPr>
+            <p:cNvPr id="9" name="Picture 8" descr="A screenshot of a graph&#10;&#10;AI-generated content may be incorrect.">
+              <a:extLst>
+                <a:ext uri="{FF2B5EF4-FFF2-40B4-BE49-F238E27FC236}">
+                  <a16:creationId xmlns:a16="http://schemas.microsoft.com/office/drawing/2014/main" id="{5CE2A402-98B8-260B-C899-C4A566117D9F}"/>
+                </a:ext>
+              </a:extLst>
+            </p:cNvPr>
+            <p:cNvPicPr>
+              <a:picLocks noChangeAspect="1"/>
+            </p:cNvPicPr>
+            <p:nvPr/>
+          </p:nvPicPr>
+          <p:blipFill>
+            <a:blip r:embed="rId10"/>
+            <a:srcRect t="11017" b="23411"/>
+            <a:stretch>
+              <a:fillRect/>
+            </a:stretch>
+          </p:blipFill>
+          <p:spPr>
+            <a:xfrm>
+              <a:off x="16801761" y="5787071"/>
+              <a:ext cx="5029200" cy="2473308"/>
+            </a:xfrm>
+            <a:prstGeom prst="rect">
+              <a:avLst/>
+            </a:prstGeom>
+            <a:ln w="12700">
+              <a:solidFill>
+                <a:schemeClr val="tx1"/>
+              </a:solidFill>
+            </a:ln>
+          </p:spPr>
+        </p:pic>
+        <p:sp>
+          <p:nvSpPr>
+            <p:cNvPr id="15" name="TextBox 14">
+              <a:extLst>
+                <a:ext uri="{FF2B5EF4-FFF2-40B4-BE49-F238E27FC236}">
+                  <a16:creationId xmlns:a16="http://schemas.microsoft.com/office/drawing/2014/main" id="{D4235DC8-6ED8-9035-1A9D-69FB66CC70FB}"/>
+                </a:ext>
+              </a:extLst>
+            </p:cNvPr>
+            <p:cNvSpPr txBox="1"/>
+            <p:nvPr/>
+          </p:nvSpPr>
+          <p:spPr>
+            <a:xfrm rot="16200000">
+              <a:off x="9401805" y="7029700"/>
+              <a:ext cx="3586110" cy="307777"/>
+            </a:xfrm>
+            <a:prstGeom prst="rect">
+              <a:avLst/>
+            </a:prstGeom>
+            <a:noFill/>
+          </p:spPr>
+          <p:txBody>
+            <a:bodyPr wrap="none" rtlCol="0">
+              <a:spAutoFit/>
+            </a:bodyPr>
+            <a:lstStyle/>
+            <a:p>
+              <a:r>
+                <a:rPr lang="en-US" sz="1400" dirty="0"/>
+                <a:t>P(Chosen | Treatment) – P(Chosen | Control)</a:t>
+              </a:r>
+            </a:p>
+          </p:txBody>
+        </p:sp>
+        <p:sp>
+          <p:nvSpPr>
+            <p:cNvPr id="16" name="TextBox 15">
+              <a:extLst>
+                <a:ext uri="{FF2B5EF4-FFF2-40B4-BE49-F238E27FC236}">
+                  <a16:creationId xmlns:a16="http://schemas.microsoft.com/office/drawing/2014/main" id="{5A1164B5-89D4-006B-D4FC-1C7E2C7B6897}"/>
+                </a:ext>
+              </a:extLst>
+            </p:cNvPr>
+            <p:cNvSpPr txBox="1"/>
+            <p:nvPr/>
+          </p:nvSpPr>
+          <p:spPr>
+            <a:xfrm>
+              <a:off x="11991500" y="5280917"/>
+              <a:ext cx="4311245" cy="369332"/>
+            </a:xfrm>
+            <a:prstGeom prst="rect">
+              <a:avLst/>
+            </a:prstGeom>
+            <a:noFill/>
+          </p:spPr>
+          <p:txBody>
+            <a:bodyPr wrap="none" rtlCol="0">
+              <a:spAutoFit/>
+            </a:bodyPr>
+            <a:lstStyle/>
+            <a:p>
+              <a:r>
+                <a:rPr lang="en-US" dirty="0"/>
+                <a:t>Treatment Safe Decoy </a:t>
+              </a:r>
+              <a:r>
+                <a:rPr lang="en-US" dirty="0" err="1"/>
+                <a:t>v.s</a:t>
+              </a:r>
+              <a:r>
+                <a:rPr lang="en-US" dirty="0"/>
+                <a:t>. Control Decoy</a:t>
+              </a:r>
+            </a:p>
+          </p:txBody>
+        </p:sp>
+        <p:sp>
+          <p:nvSpPr>
+            <p:cNvPr id="17" name="TextBox 16">
+              <a:extLst>
+                <a:ext uri="{FF2B5EF4-FFF2-40B4-BE49-F238E27FC236}">
+                  <a16:creationId xmlns:a16="http://schemas.microsoft.com/office/drawing/2014/main" id="{4B5D2979-7D1A-003B-E33A-1FCC4ADA6C6F}"/>
+                </a:ext>
+              </a:extLst>
+            </p:cNvPr>
+            <p:cNvSpPr txBox="1"/>
+            <p:nvPr/>
+          </p:nvSpPr>
+          <p:spPr>
+            <a:xfrm>
+              <a:off x="17212836" y="5280917"/>
+              <a:ext cx="4288225" cy="369332"/>
+            </a:xfrm>
+            <a:prstGeom prst="rect">
+              <a:avLst/>
+            </a:prstGeom>
+            <a:noFill/>
+          </p:spPr>
+          <p:txBody>
+            <a:bodyPr wrap="none" rtlCol="0">
+              <a:spAutoFit/>
+            </a:bodyPr>
+            <a:lstStyle/>
+            <a:p>
+              <a:r>
+                <a:rPr lang="en-US" dirty="0"/>
+                <a:t>Treatment Risky Decoy </a:t>
+              </a:r>
+              <a:r>
+                <a:rPr lang="en-US" dirty="0" err="1"/>
+                <a:t>v.s</a:t>
+              </a:r>
+              <a:r>
+                <a:rPr lang="en-US" dirty="0"/>
+                <a:t>. Control Decoy</a:t>
+              </a:r>
+            </a:p>
+          </p:txBody>
+        </p:sp>
+        <p:grpSp>
+          <p:nvGrpSpPr>
+            <p:cNvPr id="44" name="Group 43">
+              <a:extLst>
+                <a:ext uri="{FF2B5EF4-FFF2-40B4-BE49-F238E27FC236}">
+                  <a16:creationId xmlns:a16="http://schemas.microsoft.com/office/drawing/2014/main" id="{93EC42A6-3C3B-92A8-75F6-15F6CCF4A1D6}"/>
+                </a:ext>
+              </a:extLst>
+            </p:cNvPr>
+            <p:cNvGrpSpPr/>
+            <p:nvPr/>
+          </p:nvGrpSpPr>
+          <p:grpSpPr>
+            <a:xfrm>
+              <a:off x="11838598" y="8315523"/>
+              <a:ext cx="4771027" cy="380484"/>
+              <a:chOff x="11838598" y="8315523"/>
+              <a:chExt cx="4771027" cy="380484"/>
+            </a:xfrm>
+          </p:grpSpPr>
+          <p:sp>
+            <p:nvSpPr>
+              <p:cNvPr id="39" name="TextBox 38">
+                <a:extLst>
+                  <a:ext uri="{FF2B5EF4-FFF2-40B4-BE49-F238E27FC236}">
+                    <a16:creationId xmlns:a16="http://schemas.microsoft.com/office/drawing/2014/main" id="{0A576556-0BF8-1C48-0208-8A80BBA5D0E0}"/>
+                  </a:ext>
+                </a:extLst>
+              </p:cNvPr>
+              <p:cNvSpPr txBox="1"/>
+              <p:nvPr/>
+            </p:nvSpPr>
+            <p:spPr>
+              <a:xfrm>
+                <a:off x="11838598" y="8315523"/>
+                <a:ext cx="815608" cy="369332"/>
+              </a:xfrm>
+              <a:prstGeom prst="rect">
+                <a:avLst/>
+              </a:prstGeom>
+              <a:noFill/>
+            </p:spPr>
+            <p:txBody>
+              <a:bodyPr wrap="none" rtlCol="0">
+                <a:spAutoFit/>
+              </a:bodyPr>
+              <a:lstStyle/>
+              <a:p>
+                <a:r>
+                  <a:rPr lang="en-US" dirty="0"/>
+                  <a:t>Decoy</a:t>
+                </a:r>
+              </a:p>
+            </p:txBody>
+          </p:sp>
+          <p:sp>
+            <p:nvSpPr>
+              <p:cNvPr id="40" name="TextBox 39">
+                <a:extLst>
+                  <a:ext uri="{FF2B5EF4-FFF2-40B4-BE49-F238E27FC236}">
+                    <a16:creationId xmlns:a16="http://schemas.microsoft.com/office/drawing/2014/main" id="{3B6579EC-E592-B311-8B37-1BF25A595BFA}"/>
+                  </a:ext>
+                </a:extLst>
+              </p:cNvPr>
+              <p:cNvSpPr txBox="1"/>
+              <p:nvPr/>
+            </p:nvSpPr>
+            <p:spPr>
+              <a:xfrm>
+                <a:off x="13393764" y="8326675"/>
+                <a:ext cx="1395318" cy="369332"/>
+              </a:xfrm>
+              <a:prstGeom prst="rect">
+                <a:avLst/>
+              </a:prstGeom>
+              <a:noFill/>
+            </p:spPr>
+            <p:txBody>
+              <a:bodyPr wrap="none" rtlCol="0">
+                <a:spAutoFit/>
+              </a:bodyPr>
+              <a:lstStyle/>
+              <a:p>
+                <a:r>
+                  <a:rPr lang="en-US" dirty="0"/>
+                  <a:t>Risky lottery</a:t>
+                </a:r>
+              </a:p>
+            </p:txBody>
+          </p:sp>
+          <p:sp>
+            <p:nvSpPr>
+              <p:cNvPr id="42" name="TextBox 41">
+                <a:extLst>
+                  <a:ext uri="{FF2B5EF4-FFF2-40B4-BE49-F238E27FC236}">
+                    <a16:creationId xmlns:a16="http://schemas.microsoft.com/office/drawing/2014/main" id="{AFF10727-DE91-849C-D0C3-77045AA4836D}"/>
+                  </a:ext>
+                </a:extLst>
+              </p:cNvPr>
+              <p:cNvSpPr txBox="1"/>
+              <p:nvPr/>
+            </p:nvSpPr>
+            <p:spPr>
+              <a:xfrm>
+                <a:off x="15295483" y="8315523"/>
+                <a:ext cx="1314142" cy="369332"/>
+              </a:xfrm>
+              <a:prstGeom prst="rect">
+                <a:avLst/>
+              </a:prstGeom>
+              <a:noFill/>
+            </p:spPr>
+            <p:txBody>
+              <a:bodyPr wrap="none" rtlCol="0">
+                <a:spAutoFit/>
+              </a:bodyPr>
+              <a:lstStyle/>
+              <a:p>
+                <a:r>
+                  <a:rPr lang="en-US" dirty="0"/>
+                  <a:t>Safe lottery</a:t>
+                </a:r>
+              </a:p>
+            </p:txBody>
+          </p:sp>
+        </p:grpSp>
+        <p:grpSp>
+          <p:nvGrpSpPr>
+            <p:cNvPr id="45" name="Group 44">
+              <a:extLst>
+                <a:ext uri="{FF2B5EF4-FFF2-40B4-BE49-F238E27FC236}">
+                  <a16:creationId xmlns:a16="http://schemas.microsoft.com/office/drawing/2014/main" id="{E6D0FEBB-C612-8677-2E9A-707019E9ECA3}"/>
+                </a:ext>
+              </a:extLst>
+            </p:cNvPr>
+            <p:cNvGrpSpPr/>
+            <p:nvPr/>
+          </p:nvGrpSpPr>
+          <p:grpSpPr>
+            <a:xfrm>
+              <a:off x="17007445" y="8315523"/>
+              <a:ext cx="4771027" cy="380484"/>
+              <a:chOff x="11838598" y="8315523"/>
+              <a:chExt cx="4771027" cy="380484"/>
+            </a:xfrm>
+          </p:grpSpPr>
+          <p:sp>
+            <p:nvSpPr>
+              <p:cNvPr id="46" name="TextBox 45">
+                <a:extLst>
+                  <a:ext uri="{FF2B5EF4-FFF2-40B4-BE49-F238E27FC236}">
+                    <a16:creationId xmlns:a16="http://schemas.microsoft.com/office/drawing/2014/main" id="{FDFB7ECF-134A-8C3B-0F4D-BE8C05AC9EC9}"/>
+                  </a:ext>
+                </a:extLst>
+              </p:cNvPr>
+              <p:cNvSpPr txBox="1"/>
+              <p:nvPr/>
+            </p:nvSpPr>
+            <p:spPr>
+              <a:xfrm>
+                <a:off x="11838598" y="8315523"/>
+                <a:ext cx="815608" cy="369332"/>
+              </a:xfrm>
+              <a:prstGeom prst="rect">
+                <a:avLst/>
+              </a:prstGeom>
+              <a:noFill/>
+            </p:spPr>
+            <p:txBody>
+              <a:bodyPr wrap="none" rtlCol="0">
+                <a:spAutoFit/>
+              </a:bodyPr>
+              <a:lstStyle/>
+              <a:p>
+                <a:r>
+                  <a:rPr lang="en-US" dirty="0"/>
+                  <a:t>Decoy</a:t>
+                </a:r>
+              </a:p>
+            </p:txBody>
+          </p:sp>
+          <p:sp>
+            <p:nvSpPr>
+              <p:cNvPr id="49" name="TextBox 48">
+                <a:extLst>
+                  <a:ext uri="{FF2B5EF4-FFF2-40B4-BE49-F238E27FC236}">
+                    <a16:creationId xmlns:a16="http://schemas.microsoft.com/office/drawing/2014/main" id="{F2EC6E49-D5A1-1F43-2BEE-B21E434E5916}"/>
+                  </a:ext>
+                </a:extLst>
+              </p:cNvPr>
+              <p:cNvSpPr txBox="1"/>
+              <p:nvPr/>
+            </p:nvSpPr>
+            <p:spPr>
+              <a:xfrm>
+                <a:off x="13393764" y="8326675"/>
+                <a:ext cx="1395318" cy="369332"/>
+              </a:xfrm>
+              <a:prstGeom prst="rect">
+                <a:avLst/>
+              </a:prstGeom>
+              <a:noFill/>
+            </p:spPr>
+            <p:txBody>
+              <a:bodyPr wrap="none" rtlCol="0">
+                <a:spAutoFit/>
+              </a:bodyPr>
+              <a:lstStyle/>
+              <a:p>
+                <a:r>
+                  <a:rPr lang="en-US" dirty="0"/>
+                  <a:t>Risky lottery</a:t>
+                </a:r>
+              </a:p>
+            </p:txBody>
+          </p:sp>
+          <p:sp>
+            <p:nvSpPr>
+              <p:cNvPr id="50" name="TextBox 49">
+                <a:extLst>
+                  <a:ext uri="{FF2B5EF4-FFF2-40B4-BE49-F238E27FC236}">
+                    <a16:creationId xmlns:a16="http://schemas.microsoft.com/office/drawing/2014/main" id="{E788D413-43AF-01E5-44BD-C0B352D55877}"/>
+                  </a:ext>
+                </a:extLst>
+              </p:cNvPr>
+              <p:cNvSpPr txBox="1"/>
+              <p:nvPr/>
+            </p:nvSpPr>
+            <p:spPr>
+              <a:xfrm>
+                <a:off x="15295483" y="8315523"/>
+                <a:ext cx="1314142" cy="369332"/>
+              </a:xfrm>
+              <a:prstGeom prst="rect">
+                <a:avLst/>
+              </a:prstGeom>
+              <a:noFill/>
+            </p:spPr>
+            <p:txBody>
+              <a:bodyPr wrap="none" rtlCol="0">
+                <a:spAutoFit/>
+              </a:bodyPr>
+              <a:lstStyle/>
+              <a:p>
+                <a:r>
+                  <a:rPr lang="en-US" dirty="0"/>
+                  <a:t>Safe lottery</a:t>
+                </a:r>
+              </a:p>
+            </p:txBody>
+          </p:sp>
+        </p:grpSp>
+        <p:cxnSp>
+          <p:nvCxnSpPr>
+            <p:cNvPr id="89" name="Straight Connector 88">
+              <a:extLst>
+                <a:ext uri="{FF2B5EF4-FFF2-40B4-BE49-F238E27FC236}">
+                  <a16:creationId xmlns:a16="http://schemas.microsoft.com/office/drawing/2014/main" id="{19736551-9569-8752-9CFF-5C64C44DA7F6}"/>
+                </a:ext>
+              </a:extLst>
+            </p:cNvPr>
+            <p:cNvCxnSpPr>
+              <a:cxnSpLocks/>
+            </p:cNvCxnSpPr>
+            <p:nvPr/>
+          </p:nvCxnSpPr>
+          <p:spPr>
+            <a:xfrm>
+              <a:off x="11580425" y="7265075"/>
+              <a:ext cx="5029200" cy="0"/>
+            </a:xfrm>
+            <a:prstGeom prst="line">
+              <a:avLst/>
+            </a:prstGeom>
+            <a:ln w="57150">
+              <a:solidFill>
+                <a:srgbClr val="FF0000">
+                  <a:alpha val="15000"/>
+                </a:srgbClr>
+              </a:solidFill>
+            </a:ln>
+          </p:spPr>
+          <p:style>
+            <a:lnRef idx="2">
+              <a:schemeClr val="accent1"/>
+            </a:lnRef>
+            <a:fillRef idx="0">
+              <a:schemeClr val="accent1"/>
+            </a:fillRef>
+            <a:effectRef idx="1">
+              <a:schemeClr val="accent1"/>
+            </a:effectRef>
+            <a:fontRef idx="minor">
+              <a:schemeClr val="tx1"/>
+            </a:fontRef>
+          </p:style>
+        </p:cxnSp>
+        <p:cxnSp>
+          <p:nvCxnSpPr>
+            <p:cNvPr id="91" name="Straight Connector 90">
+              <a:extLst>
+                <a:ext uri="{FF2B5EF4-FFF2-40B4-BE49-F238E27FC236}">
+                  <a16:creationId xmlns:a16="http://schemas.microsoft.com/office/drawing/2014/main" id="{4AC5619A-1AD6-6C2B-D1C1-84A8DD002445}"/>
+                </a:ext>
+              </a:extLst>
+            </p:cNvPr>
+            <p:cNvCxnSpPr>
+              <a:cxnSpLocks/>
+            </p:cNvCxnSpPr>
+            <p:nvPr/>
+          </p:nvCxnSpPr>
+          <p:spPr>
+            <a:xfrm>
+              <a:off x="16801761" y="7223760"/>
+              <a:ext cx="5029200" cy="0"/>
+            </a:xfrm>
+            <a:prstGeom prst="line">
+              <a:avLst/>
+            </a:prstGeom>
+            <a:ln w="57150">
+              <a:solidFill>
+                <a:srgbClr val="FF0000">
+                  <a:alpha val="15000"/>
+                </a:srgbClr>
+              </a:solidFill>
+            </a:ln>
+          </p:spPr>
+          <p:style>
+            <a:lnRef idx="2">
+              <a:schemeClr val="accent1"/>
+            </a:lnRef>
+            <a:fillRef idx="0">
+              <a:schemeClr val="accent1"/>
+            </a:fillRef>
+            <a:effectRef idx="1">
+              <a:schemeClr val="accent1"/>
+            </a:effectRef>
+            <a:fontRef idx="minor">
+              <a:schemeClr val="tx1"/>
+            </a:fontRef>
+          </p:style>
+        </p:cxnSp>
+        <p:sp>
+          <p:nvSpPr>
+            <p:cNvPr id="95" name="TextBox 94">
+              <a:extLst>
+                <a:ext uri="{FF2B5EF4-FFF2-40B4-BE49-F238E27FC236}">
+                  <a16:creationId xmlns:a16="http://schemas.microsoft.com/office/drawing/2014/main" id="{8F577354-D5E7-1A5C-0CAE-B00756C79FEE}"/>
+                </a:ext>
+              </a:extLst>
+            </p:cNvPr>
+            <p:cNvSpPr txBox="1"/>
+            <p:nvPr/>
+          </p:nvSpPr>
+          <p:spPr>
+            <a:xfrm>
+              <a:off x="13457479" y="8791978"/>
+              <a:ext cx="1042273" cy="307777"/>
+            </a:xfrm>
+            <a:prstGeom prst="rect">
+              <a:avLst/>
+            </a:prstGeom>
+            <a:noFill/>
+          </p:spPr>
+          <p:txBody>
+            <a:bodyPr wrap="none" rtlCol="0">
+              <a:spAutoFit/>
+            </a:bodyPr>
+            <a:lstStyle/>
+            <a:p>
+              <a:r>
+                <a:rPr lang="en-US" sz="1400" dirty="0">
+                  <a:solidFill>
+                    <a:schemeClr val="tx1">
+                      <a:lumMod val="50000"/>
+                      <a:lumOff val="50000"/>
+                    </a:schemeClr>
+                  </a:solidFill>
+                </a:rPr>
+                <a:t>20% of 95¢</a:t>
+              </a:r>
+            </a:p>
+          </p:txBody>
+        </p:sp>
+        <p:sp>
+          <p:nvSpPr>
+            <p:cNvPr id="96" name="TextBox 95">
+              <a:extLst>
+                <a:ext uri="{FF2B5EF4-FFF2-40B4-BE49-F238E27FC236}">
+                  <a16:creationId xmlns:a16="http://schemas.microsoft.com/office/drawing/2014/main" id="{06BB8ECD-1A41-DFEB-19FA-CD424A74B089}"/>
+                </a:ext>
+              </a:extLst>
+            </p:cNvPr>
+            <p:cNvSpPr txBox="1"/>
+            <p:nvPr/>
+          </p:nvSpPr>
+          <p:spPr>
+            <a:xfrm>
+              <a:off x="15393420" y="8791978"/>
+              <a:ext cx="1042273" cy="307777"/>
+            </a:xfrm>
+            <a:prstGeom prst="rect">
+              <a:avLst/>
+            </a:prstGeom>
+            <a:noFill/>
+          </p:spPr>
+          <p:txBody>
+            <a:bodyPr wrap="none" rtlCol="0">
+              <a:spAutoFit/>
+            </a:bodyPr>
+            <a:lstStyle/>
+            <a:p>
+              <a:r>
+                <a:rPr lang="en-US" sz="1400" dirty="0">
+                  <a:solidFill>
+                    <a:schemeClr val="tx1">
+                      <a:lumMod val="50000"/>
+                      <a:lumOff val="50000"/>
+                    </a:schemeClr>
+                  </a:solidFill>
+                </a:rPr>
+                <a:t>95% of 20¢</a:t>
+              </a:r>
+            </a:p>
+          </p:txBody>
+        </p:sp>
+        <p:sp>
+          <p:nvSpPr>
+            <p:cNvPr id="97" name="TextBox 96">
+              <a:extLst>
+                <a:ext uri="{FF2B5EF4-FFF2-40B4-BE49-F238E27FC236}">
+                  <a16:creationId xmlns:a16="http://schemas.microsoft.com/office/drawing/2014/main" id="{74FF8272-F298-28D0-3E6B-DD1FA9B1FAA4}"/>
+                </a:ext>
+              </a:extLst>
+            </p:cNvPr>
+            <p:cNvSpPr txBox="1"/>
+            <p:nvPr/>
+          </p:nvSpPr>
+          <p:spPr>
+            <a:xfrm>
+              <a:off x="11720555" y="8662337"/>
+              <a:ext cx="1204176" cy="523220"/>
+            </a:xfrm>
+            <a:prstGeom prst="rect">
+              <a:avLst/>
+            </a:prstGeom>
+            <a:noFill/>
+          </p:spPr>
+          <p:txBody>
+            <a:bodyPr wrap="none" rtlCol="0">
+              <a:spAutoFit/>
+            </a:bodyPr>
+            <a:lstStyle/>
+            <a:p>
+              <a:r>
+                <a:rPr lang="en-US" sz="1400" dirty="0">
+                  <a:solidFill>
+                    <a:schemeClr val="tx1">
+                      <a:lumMod val="50000"/>
+                      <a:lumOff val="50000"/>
+                    </a:schemeClr>
+                  </a:solidFill>
+                </a:rPr>
+                <a:t>C 50% of 38¢</a:t>
+              </a:r>
+            </a:p>
+            <a:p>
+              <a:r>
+                <a:rPr lang="en-US" sz="1400" dirty="0">
+                  <a:solidFill>
+                    <a:schemeClr val="tx1">
+                      <a:lumMod val="50000"/>
+                      <a:lumOff val="50000"/>
+                    </a:schemeClr>
+                  </a:solidFill>
+                </a:rPr>
+                <a:t>T 95% of 10¢</a:t>
+              </a:r>
+            </a:p>
+          </p:txBody>
+        </p:sp>
+        <p:sp>
+          <p:nvSpPr>
+            <p:cNvPr id="98" name="TextBox 97">
+              <a:extLst>
+                <a:ext uri="{FF2B5EF4-FFF2-40B4-BE49-F238E27FC236}">
+                  <a16:creationId xmlns:a16="http://schemas.microsoft.com/office/drawing/2014/main" id="{F62AAA31-D9E5-3A36-C0A1-0D92E9A61200}"/>
+                </a:ext>
+              </a:extLst>
+            </p:cNvPr>
+            <p:cNvSpPr txBox="1"/>
+            <p:nvPr/>
+          </p:nvSpPr>
+          <p:spPr>
+            <a:xfrm>
+              <a:off x="18631537" y="8791978"/>
+              <a:ext cx="1042273" cy="307777"/>
+            </a:xfrm>
+            <a:prstGeom prst="rect">
+              <a:avLst/>
+            </a:prstGeom>
+            <a:noFill/>
+          </p:spPr>
+          <p:txBody>
+            <a:bodyPr wrap="none" rtlCol="0">
+              <a:spAutoFit/>
+            </a:bodyPr>
+            <a:lstStyle/>
+            <a:p>
+              <a:r>
+                <a:rPr lang="en-US" sz="1400" dirty="0">
+                  <a:solidFill>
+                    <a:schemeClr val="tx1">
+                      <a:lumMod val="50000"/>
+                      <a:lumOff val="50000"/>
+                    </a:schemeClr>
+                  </a:solidFill>
+                </a:rPr>
+                <a:t>20% of 95¢</a:t>
+              </a:r>
+            </a:p>
+          </p:txBody>
+        </p:sp>
+        <p:sp>
+          <p:nvSpPr>
+            <p:cNvPr id="99" name="TextBox 98">
+              <a:extLst>
+                <a:ext uri="{FF2B5EF4-FFF2-40B4-BE49-F238E27FC236}">
+                  <a16:creationId xmlns:a16="http://schemas.microsoft.com/office/drawing/2014/main" id="{A399EBD3-C4A4-FC37-6D37-83FD50956C17}"/>
+                </a:ext>
+              </a:extLst>
+            </p:cNvPr>
+            <p:cNvSpPr txBox="1"/>
+            <p:nvPr/>
+          </p:nvSpPr>
+          <p:spPr>
+            <a:xfrm>
+              <a:off x="20567478" y="8791978"/>
+              <a:ext cx="1042273" cy="307777"/>
+            </a:xfrm>
+            <a:prstGeom prst="rect">
+              <a:avLst/>
+            </a:prstGeom>
+            <a:noFill/>
+          </p:spPr>
+          <p:txBody>
+            <a:bodyPr wrap="none" rtlCol="0">
+              <a:spAutoFit/>
+            </a:bodyPr>
+            <a:lstStyle/>
+            <a:p>
+              <a:r>
+                <a:rPr lang="en-US" sz="1400" dirty="0">
+                  <a:solidFill>
+                    <a:schemeClr val="tx1">
+                      <a:lumMod val="50000"/>
+                      <a:lumOff val="50000"/>
+                    </a:schemeClr>
+                  </a:solidFill>
+                </a:rPr>
+                <a:t>95% of 20¢</a:t>
+              </a:r>
+            </a:p>
+          </p:txBody>
+        </p:sp>
+        <p:sp>
+          <p:nvSpPr>
+            <p:cNvPr id="100" name="TextBox 99">
+              <a:extLst>
+                <a:ext uri="{FF2B5EF4-FFF2-40B4-BE49-F238E27FC236}">
+                  <a16:creationId xmlns:a16="http://schemas.microsoft.com/office/drawing/2014/main" id="{C2A400F8-7BAA-F269-BC51-392906C6CBFD}"/>
+                </a:ext>
+              </a:extLst>
+            </p:cNvPr>
+            <p:cNvSpPr txBox="1"/>
+            <p:nvPr/>
+          </p:nvSpPr>
+          <p:spPr>
+            <a:xfrm>
+              <a:off x="16835051" y="8662337"/>
+              <a:ext cx="1313180" cy="523220"/>
+            </a:xfrm>
+            <a:prstGeom prst="rect">
+              <a:avLst/>
+            </a:prstGeom>
+            <a:noFill/>
+          </p:spPr>
+          <p:txBody>
+            <a:bodyPr wrap="none" rtlCol="0">
+              <a:spAutoFit/>
+            </a:bodyPr>
+            <a:lstStyle/>
+            <a:p>
+              <a:r>
+                <a:rPr lang="en-US" sz="1400" dirty="0">
+                  <a:solidFill>
+                    <a:schemeClr val="tx1">
+                      <a:lumMod val="50000"/>
+                      <a:lumOff val="50000"/>
+                    </a:schemeClr>
+                  </a:solidFill>
+                </a:rPr>
+                <a:t>C 50% of 38¢</a:t>
+              </a:r>
+            </a:p>
+            <a:p>
+              <a:r>
+                <a:rPr lang="en-US" sz="1400" dirty="0">
+                  <a:solidFill>
+                    <a:schemeClr val="tx1">
+                      <a:lumMod val="50000"/>
+                      <a:lumOff val="50000"/>
+                    </a:schemeClr>
+                  </a:solidFill>
+                </a:rPr>
+                <a:t>T 20% of 47.5¢</a:t>
+              </a:r>
+            </a:p>
+          </p:txBody>
+        </p:sp>
+      </p:grpSp>
+      <p:sp>
+        <p:nvSpPr>
+          <p:cNvPr id="101" name="TextBox 100">
+            <a:extLst>
+              <a:ext uri="{FF2B5EF4-FFF2-40B4-BE49-F238E27FC236}">
+                <a16:creationId xmlns:a16="http://schemas.microsoft.com/office/drawing/2014/main" id="{806B2D21-2DBB-785B-6FD5-C9CBEFF04DBD}"/>
+              </a:ext>
+            </a:extLst>
+          </p:cNvPr>
+          <p:cNvSpPr txBox="1"/>
+          <p:nvPr/>
+        </p:nvSpPr>
+        <p:spPr>
+          <a:xfrm>
+            <a:off x="15887112" y="14026722"/>
+            <a:ext cx="1042273" cy="307777"/>
+          </a:xfrm>
+          <a:prstGeom prst="rect">
+            <a:avLst/>
+          </a:prstGeom>
+          <a:noFill/>
+        </p:spPr>
+        <p:txBody>
+          <a:bodyPr wrap="none" rtlCol="0">
+            <a:spAutoFit/>
+          </a:bodyPr>
+          <a:lstStyle/>
+          <a:p>
+            <a:r>
+              <a:rPr lang="en-US" sz="1400" dirty="0">
+                <a:solidFill>
+                  <a:schemeClr val="tx1">
+                    <a:lumMod val="50000"/>
+                    <a:lumOff val="50000"/>
+                  </a:schemeClr>
+                </a:solidFill>
+              </a:rPr>
+              <a:t>20% of 95¢</a:t>
+            </a:r>
+          </a:p>
+        </p:txBody>
+      </p:sp>
+      <p:sp>
+        <p:nvSpPr>
+          <p:cNvPr id="102" name="TextBox 101">
+            <a:extLst>
+              <a:ext uri="{FF2B5EF4-FFF2-40B4-BE49-F238E27FC236}">
+                <a16:creationId xmlns:a16="http://schemas.microsoft.com/office/drawing/2014/main" id="{20320365-0042-6F58-E97C-265F9EC2A888}"/>
+              </a:ext>
+            </a:extLst>
+          </p:cNvPr>
+          <p:cNvSpPr txBox="1"/>
+          <p:nvPr/>
+        </p:nvSpPr>
+        <p:spPr>
+          <a:xfrm>
+            <a:off x="18215414" y="14026722"/>
+            <a:ext cx="1042273" cy="307777"/>
+          </a:xfrm>
+          <a:prstGeom prst="rect">
+            <a:avLst/>
+          </a:prstGeom>
+          <a:noFill/>
+        </p:spPr>
+        <p:txBody>
+          <a:bodyPr wrap="none" rtlCol="0">
+            <a:spAutoFit/>
+          </a:bodyPr>
+          <a:lstStyle/>
+          <a:p>
+            <a:r>
+              <a:rPr lang="en-US" sz="1400" dirty="0">
+                <a:solidFill>
+                  <a:schemeClr val="tx1">
+                    <a:lumMod val="50000"/>
+                    <a:lumOff val="50000"/>
+                  </a:schemeClr>
+                </a:solidFill>
+              </a:rPr>
+              <a:t>95% of 20¢</a:t>
+            </a:r>
+          </a:p>
+        </p:txBody>
+      </p:sp>
+      <p:sp>
+        <p:nvSpPr>
+          <p:cNvPr id="103" name="TextBox 102">
+            <a:extLst>
+              <a:ext uri="{FF2B5EF4-FFF2-40B4-BE49-F238E27FC236}">
+                <a16:creationId xmlns:a16="http://schemas.microsoft.com/office/drawing/2014/main" id="{E89727B6-BA56-4166-476F-F961C87C6D59}"/>
+              </a:ext>
+            </a:extLst>
+          </p:cNvPr>
+          <p:cNvSpPr txBox="1"/>
+          <p:nvPr/>
+        </p:nvSpPr>
+        <p:spPr>
+          <a:xfrm>
+            <a:off x="13652009" y="13986950"/>
+            <a:ext cx="1375633" cy="523220"/>
+          </a:xfrm>
+          <a:prstGeom prst="rect">
+            <a:avLst/>
+          </a:prstGeom>
+          <a:noFill/>
+        </p:spPr>
+        <p:txBody>
+          <a:bodyPr wrap="none" rtlCol="0">
+            <a:spAutoFit/>
+          </a:bodyPr>
+          <a:lstStyle/>
+          <a:p>
+            <a:r>
+              <a:rPr lang="en-US" sz="1400" dirty="0">
+                <a:solidFill>
+                  <a:schemeClr val="tx1">
+                    <a:lumMod val="50000"/>
+                    <a:lumOff val="50000"/>
+                  </a:schemeClr>
+                </a:solidFill>
+              </a:rPr>
+              <a:t>S’ 95% of 10¢</a:t>
+            </a:r>
+          </a:p>
+          <a:p>
+            <a:r>
+              <a:rPr lang="en-US" sz="1400" dirty="0">
+                <a:solidFill>
+                  <a:schemeClr val="tx1">
+                    <a:lumMod val="50000"/>
+                    <a:lumOff val="50000"/>
+                  </a:schemeClr>
+                </a:solidFill>
+              </a:rPr>
+              <a:t>R’ 20% of 47.5¢</a:t>
+            </a:r>
+          </a:p>
+        </p:txBody>
+      </p:sp>
+      <p:sp>
+        <p:nvSpPr>
+          <p:cNvPr id="105" name="TextBox 104">
+            <a:extLst>
+              <a:ext uri="{FF2B5EF4-FFF2-40B4-BE49-F238E27FC236}">
+                <a16:creationId xmlns:a16="http://schemas.microsoft.com/office/drawing/2014/main" id="{8A029331-D8E0-F9A0-0171-1981416F0339}"/>
+              </a:ext>
+            </a:extLst>
+          </p:cNvPr>
+          <p:cNvSpPr txBox="1"/>
+          <p:nvPr/>
+        </p:nvSpPr>
+        <p:spPr>
+          <a:xfrm>
+            <a:off x="12497215" y="20098194"/>
+            <a:ext cx="1228157" cy="523220"/>
+          </a:xfrm>
+          <a:prstGeom prst="rect">
+            <a:avLst/>
+          </a:prstGeom>
+          <a:noFill/>
+        </p:spPr>
+        <p:txBody>
+          <a:bodyPr wrap="none" rtlCol="0">
+            <a:spAutoFit/>
+          </a:bodyPr>
+          <a:lstStyle/>
+          <a:p>
+            <a:r>
+              <a:rPr lang="en-US" sz="1400" dirty="0">
+                <a:solidFill>
+                  <a:schemeClr val="tx1">
+                    <a:lumMod val="50000"/>
+                    <a:lumOff val="50000"/>
+                  </a:schemeClr>
+                </a:solidFill>
+              </a:rPr>
+              <a:t>S 95% of 20¢</a:t>
+            </a:r>
+          </a:p>
+          <a:p>
+            <a:r>
+              <a:rPr lang="en-US" sz="1400" dirty="0">
+                <a:solidFill>
+                  <a:schemeClr val="tx1">
+                    <a:lumMod val="50000"/>
+                    <a:lumOff val="50000"/>
+                  </a:schemeClr>
+                </a:solidFill>
+              </a:rPr>
+              <a:t>R 20% of 95¢</a:t>
+            </a:r>
+          </a:p>
+        </p:txBody>
+      </p:sp>
+      <p:sp>
+        <p:nvSpPr>
+          <p:cNvPr id="106" name="TextBox 105">
+            <a:extLst>
+              <a:ext uri="{FF2B5EF4-FFF2-40B4-BE49-F238E27FC236}">
+                <a16:creationId xmlns:a16="http://schemas.microsoft.com/office/drawing/2014/main" id="{6E8DFD2E-776F-DA80-6B28-F24D5102E7EF}"/>
+              </a:ext>
+            </a:extLst>
+          </p:cNvPr>
+          <p:cNvSpPr txBox="1"/>
+          <p:nvPr/>
+        </p:nvSpPr>
+        <p:spPr>
+          <a:xfrm>
+            <a:off x="19284199" y="20100053"/>
+            <a:ext cx="1180131" cy="523220"/>
+          </a:xfrm>
+          <a:prstGeom prst="rect">
+            <a:avLst/>
+          </a:prstGeom>
+          <a:noFill/>
+        </p:spPr>
+        <p:txBody>
+          <a:bodyPr wrap="none" rtlCol="0">
+            <a:spAutoFit/>
+          </a:bodyPr>
+          <a:lstStyle/>
+          <a:p>
+            <a:r>
+              <a:rPr lang="en-US" sz="1400" dirty="0">
+                <a:solidFill>
+                  <a:schemeClr val="tx1">
+                    <a:lumMod val="50000"/>
+                    <a:lumOff val="50000"/>
+                  </a:schemeClr>
+                </a:solidFill>
+              </a:rPr>
+              <a:t>S 75% of 40¢</a:t>
+            </a:r>
+          </a:p>
+          <a:p>
+            <a:r>
+              <a:rPr lang="en-US" sz="1400" dirty="0">
+                <a:solidFill>
+                  <a:schemeClr val="tx1">
+                    <a:lumMod val="50000"/>
+                    <a:lumOff val="50000"/>
+                  </a:schemeClr>
+                </a:solidFill>
+              </a:rPr>
+              <a:t>R 40% of 75¢</a:t>
+            </a:r>
+          </a:p>
+        </p:txBody>
+      </p:sp>
+      <p:sp>
+        <p:nvSpPr>
+          <p:cNvPr id="107" name="TextBox 106">
+            <a:extLst>
+              <a:ext uri="{FF2B5EF4-FFF2-40B4-BE49-F238E27FC236}">
+                <a16:creationId xmlns:a16="http://schemas.microsoft.com/office/drawing/2014/main" id="{7EE8DF8C-6B5F-A305-D6E0-F01846130CA2}"/>
+              </a:ext>
+            </a:extLst>
+          </p:cNvPr>
+          <p:cNvSpPr txBox="1"/>
+          <p:nvPr/>
+        </p:nvSpPr>
+        <p:spPr>
+          <a:xfrm>
+            <a:off x="10769108" y="4843644"/>
+            <a:ext cx="4930389" cy="369332"/>
+          </a:xfrm>
+          <a:prstGeom prst="rect">
+            <a:avLst/>
+          </a:prstGeom>
+          <a:noFill/>
+        </p:spPr>
+        <p:txBody>
+          <a:bodyPr wrap="none" rtlCol="0">
+            <a:spAutoFit/>
+          </a:bodyPr>
+          <a:lstStyle/>
+          <a:p>
+            <a:r>
+              <a:rPr lang="en-US" dirty="0"/>
+              <a:t>Effect of having a decoy that is similar but worse</a:t>
             </a:r>
           </a:p>
         </p:txBody>

</xml_diff>